<commit_message>
updated 2013 and 2014 - differentiated colors
</commit_message>
<xml_diff>
--- a/2013/taag/troop457AtAGlance.pptx
+++ b/2013/taag/troop457AtAGlance.pptx
@@ -8,7 +8,7 @@
     <p:sldId id="259" r:id="rId2"/>
   </p:sldIdLst>
   <p:sldSz cx="9144000" cy="6858000" type="screen4x3"/>
-  <p:notesSz cx="6858000" cy="9144000"/>
+  <p:notesSz cx="7010400" cy="9236075"/>
   <p:defaultTextStyle>
     <a:defPPr>
       <a:defRPr lang="en-US"/>
@@ -289,7 +289,7 @@
             <a:fld id="{1F6864BD-AB7C-4E72-96C5-F30924BF62CA}" type="datetimeFigureOut">
               <a:rPr lang="en-US" smtClean="0"/>
               <a:pPr/>
-              <a:t>7/16/2012</a:t>
+              <a:t>9/24/2013</a:t>
             </a:fld>
             <a:endParaRPr lang="en-US"/>
           </a:p>
@@ -456,7 +456,7 @@
             <a:fld id="{1F6864BD-AB7C-4E72-96C5-F30924BF62CA}" type="datetimeFigureOut">
               <a:rPr lang="en-US" smtClean="0"/>
               <a:pPr/>
-              <a:t>7/16/2012</a:t>
+              <a:t>9/24/2013</a:t>
             </a:fld>
             <a:endParaRPr lang="en-US"/>
           </a:p>
@@ -633,7 +633,7 @@
             <a:fld id="{1F6864BD-AB7C-4E72-96C5-F30924BF62CA}" type="datetimeFigureOut">
               <a:rPr lang="en-US" smtClean="0"/>
               <a:pPr/>
-              <a:t>7/16/2012</a:t>
+              <a:t>9/24/2013</a:t>
             </a:fld>
             <a:endParaRPr lang="en-US"/>
           </a:p>
@@ -800,7 +800,7 @@
             <a:fld id="{1F6864BD-AB7C-4E72-96C5-F30924BF62CA}" type="datetimeFigureOut">
               <a:rPr lang="en-US" smtClean="0"/>
               <a:pPr/>
-              <a:t>7/16/2012</a:t>
+              <a:t>9/24/2013</a:t>
             </a:fld>
             <a:endParaRPr lang="en-US"/>
           </a:p>
@@ -1043,7 +1043,7 @@
             <a:fld id="{1F6864BD-AB7C-4E72-96C5-F30924BF62CA}" type="datetimeFigureOut">
               <a:rPr lang="en-US" smtClean="0"/>
               <a:pPr/>
-              <a:t>7/16/2012</a:t>
+              <a:t>9/24/2013</a:t>
             </a:fld>
             <a:endParaRPr lang="en-US"/>
           </a:p>
@@ -1328,7 +1328,7 @@
             <a:fld id="{1F6864BD-AB7C-4E72-96C5-F30924BF62CA}" type="datetimeFigureOut">
               <a:rPr lang="en-US" smtClean="0"/>
               <a:pPr/>
-              <a:t>7/16/2012</a:t>
+              <a:t>9/24/2013</a:t>
             </a:fld>
             <a:endParaRPr lang="en-US"/>
           </a:p>
@@ -1747,7 +1747,7 @@
             <a:fld id="{1F6864BD-AB7C-4E72-96C5-F30924BF62CA}" type="datetimeFigureOut">
               <a:rPr lang="en-US" smtClean="0"/>
               <a:pPr/>
-              <a:t>7/16/2012</a:t>
+              <a:t>9/24/2013</a:t>
             </a:fld>
             <a:endParaRPr lang="en-US"/>
           </a:p>
@@ -1862,7 +1862,7 @@
             <a:fld id="{1F6864BD-AB7C-4E72-96C5-F30924BF62CA}" type="datetimeFigureOut">
               <a:rPr lang="en-US" smtClean="0"/>
               <a:pPr/>
-              <a:t>7/16/2012</a:t>
+              <a:t>9/24/2013</a:t>
             </a:fld>
             <a:endParaRPr lang="en-US"/>
           </a:p>
@@ -1968,7 +1968,7 @@
             <a:fld id="{1F6864BD-AB7C-4E72-96C5-F30924BF62CA}" type="datetimeFigureOut">
               <a:rPr lang="en-US" smtClean="0"/>
               <a:pPr/>
-              <a:t>7/16/2012</a:t>
+              <a:t>9/24/2013</a:t>
             </a:fld>
             <a:endParaRPr lang="en-US"/>
           </a:p>
@@ -2017,7 +2017,13 @@
           <p:cNvGraphicFramePr>
             <a:graphicFrameLocks noGrp="1"/>
           </p:cNvGraphicFramePr>
-          <p:nvPr userDrawn="1"/>
+          <p:nvPr userDrawn="1">
+            <p:extLst>
+              <p:ext uri="{D42A27DB-BD31-4B8C-83A1-F6EECF244321}">
+                <p14:modId xmlns:p14="http://schemas.microsoft.com/office/powerpoint/2010/main" val="4185317136"/>
+              </p:ext>
+            </p:extLst>
+          </p:nvPr>
         </p:nvGraphicFramePr>
         <p:xfrm>
           <a:off x="152401" y="551616"/>
@@ -2027,7 +2033,7 @@
           <a:graphicData uri="http://schemas.openxmlformats.org/drawingml/2006/table">
             <a:tbl>
               <a:tblPr firstRow="1" bandRow="1">
-                <a:tableStyleId>{21E4AEA4-8DFA-4A89-87EB-49C32662AFE0}</a:tableStyleId>
+                <a:tableStyleId>{00A15C55-8517-42AA-B614-E9B94910E393}</a:tableStyleId>
               </a:tblPr>
               <a:tblGrid>
                 <a:gridCol w="1118271"/>
@@ -2062,9 +2068,7 @@
                     <a:p>
                       <a:pPr algn="ctr"/>
                       <a:r>
-                        <a:rPr lang="en-US" sz="1400" dirty="0" err="1" smtClean="0">
-                          <a:latin typeface="Futura Lt" pitchFamily="34" charset="0"/>
-                        </a:rPr>
+                        <a:rPr lang="en-US" sz="1400" dirty="0" err="1" smtClean="0"/>
                         <a:t>jan</a:t>
                       </a:r>
                       <a:endParaRPr lang="en-US" sz="1400" dirty="0">
@@ -2081,9 +2085,7 @@
                     <a:p>
                       <a:pPr algn="ctr"/>
                       <a:r>
-                        <a:rPr lang="en-US" sz="1400" dirty="0" err="1" smtClean="0">
-                          <a:latin typeface="Futura Lt" pitchFamily="34" charset="0"/>
-                        </a:rPr>
+                        <a:rPr lang="en-US" sz="1400" dirty="0" err="1" smtClean="0"/>
                         <a:t>feb</a:t>
                       </a:r>
                       <a:endParaRPr lang="en-US" sz="1400" dirty="0">
@@ -2100,9 +2102,7 @@
                     <a:p>
                       <a:pPr algn="ctr"/>
                       <a:r>
-                        <a:rPr lang="en-US" sz="1400" dirty="0" smtClean="0">
-                          <a:latin typeface="Futura Lt" pitchFamily="34" charset="0"/>
-                        </a:rPr>
+                        <a:rPr lang="en-US" sz="1400" dirty="0" smtClean="0"/>
                         <a:t>mar</a:t>
                       </a:r>
                       <a:endParaRPr lang="en-US" sz="1400" dirty="0">
@@ -2119,9 +2119,7 @@
                     <a:p>
                       <a:pPr algn="ctr"/>
                       <a:r>
-                        <a:rPr lang="en-US" sz="1400" dirty="0" err="1" smtClean="0">
-                          <a:latin typeface="Futura Lt" pitchFamily="34" charset="0"/>
-                        </a:rPr>
+                        <a:rPr lang="en-US" sz="1400" dirty="0" err="1" smtClean="0"/>
                         <a:t>apr</a:t>
                       </a:r>
                       <a:endParaRPr lang="en-US" sz="1400" dirty="0">
@@ -2138,9 +2136,7 @@
                     <a:p>
                       <a:pPr algn="ctr"/>
                       <a:r>
-                        <a:rPr lang="en-US" sz="1400" dirty="0" smtClean="0">
-                          <a:latin typeface="Futura Lt" pitchFamily="34" charset="0"/>
-                        </a:rPr>
+                        <a:rPr lang="en-US" sz="1400" dirty="0" smtClean="0"/>
                         <a:t>may</a:t>
                       </a:r>
                       <a:endParaRPr lang="en-US" sz="1400" dirty="0">
@@ -2157,9 +2153,7 @@
                     <a:p>
                       <a:pPr algn="ctr"/>
                       <a:r>
-                        <a:rPr lang="en-US" sz="1400" dirty="0" err="1" smtClean="0">
-                          <a:latin typeface="Futura Lt" pitchFamily="34" charset="0"/>
-                        </a:rPr>
+                        <a:rPr lang="en-US" sz="1400" dirty="0" err="1" smtClean="0"/>
                         <a:t>jun</a:t>
                       </a:r>
                       <a:endParaRPr lang="en-US" sz="1400" dirty="0">
@@ -2176,9 +2170,7 @@
                     <a:p>
                       <a:pPr algn="ctr"/>
                       <a:r>
-                        <a:rPr lang="en-US" sz="1400" dirty="0" err="1" smtClean="0">
-                          <a:latin typeface="Futura Lt" pitchFamily="34" charset="0"/>
-                        </a:rPr>
+                        <a:rPr lang="en-US" sz="1400" dirty="0" err="1" smtClean="0"/>
                         <a:t>jul</a:t>
                       </a:r>
                       <a:endParaRPr lang="en-US" sz="1400" dirty="0">
@@ -2195,9 +2187,7 @@
                     <a:p>
                       <a:pPr algn="ctr"/>
                       <a:r>
-                        <a:rPr lang="en-US" sz="1400" dirty="0" err="1" smtClean="0">
-                          <a:latin typeface="Futura Lt" pitchFamily="34" charset="0"/>
-                        </a:rPr>
+                        <a:rPr lang="en-US" sz="1400" dirty="0" err="1" smtClean="0"/>
                         <a:t>aug</a:t>
                       </a:r>
                       <a:endParaRPr lang="en-US" sz="1400" dirty="0">
@@ -2214,9 +2204,7 @@
                     <a:p>
                       <a:pPr algn="ctr"/>
                       <a:r>
-                        <a:rPr lang="en-US" sz="1400" dirty="0" smtClean="0">
-                          <a:latin typeface="Futura Lt" pitchFamily="34" charset="0"/>
-                        </a:rPr>
+                        <a:rPr lang="en-US" sz="1400" dirty="0" smtClean="0"/>
                         <a:t>sep</a:t>
                       </a:r>
                       <a:endParaRPr lang="en-US" sz="1400" dirty="0">
@@ -2233,9 +2221,7 @@
                     <a:p>
                       <a:pPr algn="ctr"/>
                       <a:r>
-                        <a:rPr lang="en-US" sz="1400" dirty="0" err="1" smtClean="0">
-                          <a:latin typeface="Futura Lt" pitchFamily="34" charset="0"/>
-                        </a:rPr>
+                        <a:rPr lang="en-US" sz="1400" dirty="0" err="1" smtClean="0"/>
                         <a:t>oct</a:t>
                       </a:r>
                       <a:endParaRPr lang="en-US" sz="1400" dirty="0">
@@ -2252,9 +2238,7 @@
                     <a:p>
                       <a:pPr algn="ctr"/>
                       <a:r>
-                        <a:rPr lang="en-US" sz="1400" dirty="0" err="1" smtClean="0">
-                          <a:latin typeface="Futura Lt" pitchFamily="34" charset="0"/>
-                        </a:rPr>
+                        <a:rPr lang="en-US" sz="1400" dirty="0" err="1" smtClean="0"/>
                         <a:t>nov</a:t>
                       </a:r>
                       <a:endParaRPr lang="en-US" sz="1400" dirty="0">
@@ -2271,9 +2255,7 @@
                     <a:p>
                       <a:pPr algn="ctr"/>
                       <a:r>
-                        <a:rPr lang="en-US" sz="1400" dirty="0" err="1" smtClean="0">
-                          <a:latin typeface="Futura Lt" pitchFamily="34" charset="0"/>
-                        </a:rPr>
+                        <a:rPr lang="en-US" sz="1400" dirty="0" err="1" smtClean="0"/>
                         <a:t>dec</a:t>
                       </a:r>
                       <a:endParaRPr lang="en-US" sz="1400" dirty="0">
@@ -3745,6 +3727,13 @@
   <p:clrMapOvr>
     <a:masterClrMapping/>
   </p:clrMapOvr>
+  <p:timing>
+    <p:tnLst>
+      <p:par>
+        <p:cTn id="1" dur="indefinite" restart="never" nodeType="tmRoot"/>
+      </p:par>
+    </p:tnLst>
+  </p:timing>
 </p:sldLayout>
 </file>
 
@@ -3965,7 +3954,7 @@
             <a:fld id="{1F6864BD-AB7C-4E72-96C5-F30924BF62CA}" type="datetimeFigureOut">
               <a:rPr lang="en-US" smtClean="0"/>
               <a:pPr/>
-              <a:t>7/16/2012</a:t>
+              <a:t>9/24/2013</a:t>
             </a:fld>
             <a:endParaRPr lang="en-US"/>
           </a:p>
@@ -4215,7 +4204,7 @@
             <a:fld id="{1F6864BD-AB7C-4E72-96C5-F30924BF62CA}" type="datetimeFigureOut">
               <a:rPr lang="en-US" smtClean="0"/>
               <a:pPr/>
-              <a:t>7/16/2012</a:t>
+              <a:t>9/24/2013</a:t>
             </a:fld>
             <a:endParaRPr lang="en-US"/>
           </a:p>
@@ -4425,7 +4414,7 @@
             <a:fld id="{1F6864BD-AB7C-4E72-96C5-F30924BF62CA}" type="datetimeFigureOut">
               <a:rPr lang="en-US" smtClean="0"/>
               <a:pPr/>
-              <a:t>7/16/2012</a:t>
+              <a:t>9/24/2013</a:t>
             </a:fld>
             <a:endParaRPr lang="en-US"/>
           </a:p>
@@ -5244,23 +5233,7 @@
           <a:p>
             <a:r>
               <a:rPr lang="en-US" sz="1100" b="1" dirty="0" smtClean="0"/>
-              <a:t>[</a:t>
-            </a:r>
-            <a:r>
-              <a:rPr lang="en-US" sz="1100" b="1" dirty="0" smtClean="0"/>
-              <a:t>18 </a:t>
-            </a:r>
-            <a:r>
-              <a:rPr lang="en-US" sz="1100" b="1" dirty="0" smtClean="0"/>
-              <a:t>– </a:t>
-            </a:r>
-            <a:r>
-              <a:rPr lang="en-US" sz="1100" b="1" dirty="0" smtClean="0"/>
-              <a:t>21</a:t>
-            </a:r>
-            <a:r>
-              <a:rPr lang="en-US" sz="1100" b="1" dirty="0" smtClean="0"/>
-              <a:t>]</a:t>
+              <a:t>[18 – 21]</a:t>
             </a:r>
             <a:endParaRPr lang="en-US" sz="1100" b="1" dirty="0"/>
           </a:p>
@@ -5290,23 +5263,7 @@
           <a:p>
             <a:r>
               <a:rPr lang="en-US" sz="1100" b="1" dirty="0" smtClean="0"/>
-              <a:t>[</a:t>
-            </a:r>
-            <a:r>
-              <a:rPr lang="en-US" sz="1100" b="1" dirty="0" smtClean="0"/>
-              <a:t>15 </a:t>
-            </a:r>
-            <a:r>
-              <a:rPr lang="en-US" sz="1100" b="1" dirty="0" smtClean="0"/>
-              <a:t>– </a:t>
-            </a:r>
-            <a:r>
-              <a:rPr lang="en-US" sz="1100" b="1" dirty="0" smtClean="0"/>
-              <a:t>17</a:t>
-            </a:r>
-            <a:r>
-              <a:rPr lang="en-US" sz="1100" b="1" dirty="0" smtClean="0"/>
-              <a:t>]</a:t>
+              <a:t>[15 – 17]</a:t>
             </a:r>
             <a:endParaRPr lang="en-US" sz="1100" b="1" dirty="0"/>
           </a:p>
@@ -5336,19 +5293,7 @@
           <a:p>
             <a:r>
               <a:rPr lang="en-US" sz="1100" b="1" dirty="0" smtClean="0"/>
-              <a:t>[16 </a:t>
-            </a:r>
-            <a:r>
-              <a:rPr lang="en-US" sz="1100" b="1" dirty="0" smtClean="0"/>
-              <a:t>– </a:t>
-            </a:r>
-            <a:r>
-              <a:rPr lang="en-US" sz="1100" b="1" dirty="0" smtClean="0"/>
-              <a:t>17</a:t>
-            </a:r>
-            <a:r>
-              <a:rPr lang="en-US" sz="1100" b="1" dirty="0" smtClean="0"/>
-              <a:t>]</a:t>
+              <a:t>[16 – 17]</a:t>
             </a:r>
             <a:endParaRPr lang="en-US" sz="1100" b="1" dirty="0"/>
           </a:p>
@@ -5438,23 +5383,7 @@
           <a:p>
             <a:r>
               <a:rPr lang="en-US" sz="1100" b="1" dirty="0" smtClean="0"/>
-              <a:t>[</a:t>
-            </a:r>
-            <a:r>
-              <a:rPr lang="en-US" sz="1100" b="1" dirty="0" smtClean="0"/>
-              <a:t>19 </a:t>
-            </a:r>
-            <a:r>
-              <a:rPr lang="en-US" sz="1100" b="1" dirty="0" smtClean="0"/>
-              <a:t>– </a:t>
-            </a:r>
-            <a:r>
-              <a:rPr lang="en-US" sz="1100" b="1" dirty="0" smtClean="0"/>
-              <a:t>21</a:t>
-            </a:r>
-            <a:r>
-              <a:rPr lang="en-US" sz="1100" b="1" dirty="0" smtClean="0"/>
-              <a:t>]</a:t>
+              <a:t>[19 – 21]</a:t>
             </a:r>
             <a:endParaRPr lang="en-US" sz="1100" b="1" dirty="0"/>
           </a:p>
@@ -5484,19 +5413,7 @@
           <a:p>
             <a:r>
               <a:rPr lang="en-US" sz="1100" b="1" dirty="0" smtClean="0"/>
-              <a:t>[</a:t>
-            </a:r>
-            <a:r>
-              <a:rPr lang="en-US" sz="1100" b="1" dirty="0" smtClean="0"/>
-              <a:t>07 </a:t>
-            </a:r>
-            <a:r>
-              <a:rPr lang="en-US" sz="1100" b="1" dirty="0" smtClean="0"/>
-              <a:t>– </a:t>
-            </a:r>
-            <a:r>
-              <a:rPr lang="en-US" sz="1100" b="1" dirty="0" smtClean="0"/>
-              <a:t>13]</a:t>
+              <a:t>[07 – 13]</a:t>
             </a:r>
             <a:endParaRPr lang="en-US" sz="1100" b="1" dirty="0"/>
           </a:p>
@@ -5526,19 +5443,7 @@
           <a:p>
             <a:r>
               <a:rPr lang="en-US" sz="1100" b="1" dirty="0" smtClean="0"/>
-              <a:t>[10 </a:t>
-            </a:r>
-            <a:r>
-              <a:rPr lang="en-US" sz="1100" b="1" dirty="0" smtClean="0"/>
-              <a:t>– </a:t>
-            </a:r>
-            <a:r>
-              <a:rPr lang="en-US" sz="1100" b="1" dirty="0" smtClean="0"/>
-              <a:t>11</a:t>
-            </a:r>
-            <a:r>
-              <a:rPr lang="en-US" sz="1100" b="1" dirty="0" smtClean="0"/>
-              <a:t>]</a:t>
+              <a:t>[10 – 11]</a:t>
             </a:r>
             <a:endParaRPr lang="en-US" sz="1100" b="1" dirty="0"/>
           </a:p>
@@ -5568,19 +5473,7 @@
           <a:p>
             <a:r>
               <a:rPr lang="en-US" sz="1100" b="1" dirty="0" smtClean="0"/>
-              <a:t>[21 </a:t>
-            </a:r>
-            <a:r>
-              <a:rPr lang="en-US" sz="1100" b="1" dirty="0" smtClean="0"/>
-              <a:t>– </a:t>
-            </a:r>
-            <a:r>
-              <a:rPr lang="en-US" sz="1100" b="1" dirty="0" smtClean="0"/>
-              <a:t>22</a:t>
-            </a:r>
-            <a:r>
-              <a:rPr lang="en-US" sz="1100" b="1" dirty="0" smtClean="0"/>
-              <a:t>]</a:t>
+              <a:t>[21 – 22]</a:t>
             </a:r>
             <a:endParaRPr lang="en-US" sz="1100" b="1" dirty="0"/>
           </a:p>
@@ -5610,11 +5503,7 @@
           <a:p>
             <a:r>
               <a:rPr lang="en-US" sz="1100" b="1" dirty="0" smtClean="0"/>
-              <a:t>[19 – </a:t>
-            </a:r>
-            <a:r>
-              <a:rPr lang="en-US" sz="1100" b="1" dirty="0" smtClean="0"/>
-              <a:t>20]</a:t>
+              <a:t>[19 – 20]</a:t>
             </a:r>
             <a:endParaRPr lang="en-US" sz="1100" b="1" dirty="0"/>
           </a:p>
@@ -5644,11 +5533,7 @@
           <a:p>
             <a:r>
               <a:rPr lang="en-US" sz="1100" b="1" dirty="0" smtClean="0"/>
-              <a:t>[</a:t>
-            </a:r>
-            <a:r>
-              <a:rPr lang="en-US" sz="1100" b="1" dirty="0" smtClean="0"/>
-              <a:t>16 – 17]</a:t>
+              <a:t>[16 – 17]</a:t>
             </a:r>
             <a:endParaRPr lang="en-US" sz="1100" b="1" dirty="0"/>
           </a:p>
@@ -5678,23 +5563,7 @@
           <a:p>
             <a:r>
               <a:rPr lang="en-US" sz="1100" b="1" dirty="0" smtClean="0"/>
-              <a:t>[</a:t>
-            </a:r>
-            <a:r>
-              <a:rPr lang="en-US" sz="1100" b="1" dirty="0" smtClean="0"/>
-              <a:t>07 </a:t>
-            </a:r>
-            <a:r>
-              <a:rPr lang="en-US" sz="1100" b="1" dirty="0" smtClean="0"/>
-              <a:t>– </a:t>
-            </a:r>
-            <a:r>
-              <a:rPr lang="en-US" sz="1100" b="1" dirty="0" smtClean="0"/>
-              <a:t>08</a:t>
-            </a:r>
-            <a:r>
-              <a:rPr lang="en-US" sz="1100" b="1" dirty="0" smtClean="0"/>
-              <a:t>]</a:t>
+              <a:t>[07 – 08]</a:t>
             </a:r>
             <a:endParaRPr lang="en-US" sz="1100" b="1" dirty="0"/>
           </a:p>
@@ -5778,9 +5647,6 @@
               </a:rPr>
               <a:t>Ross</a:t>
             </a:r>
-            <a:endParaRPr lang="en-US" sz="1100" b="1" i="1" dirty="0" smtClean="0">
-              <a:latin typeface="Book Antiqua" pitchFamily="18" charset="0"/>
-            </a:endParaRPr>
           </a:p>
         </p:txBody>
       </p:sp>
@@ -5854,9 +5720,6 @@
               </a:rPr>
               <a:t>Valley</a:t>
             </a:r>
-            <a:endParaRPr lang="en-US" sz="1100" b="1" i="1" dirty="0" smtClean="0">
-              <a:latin typeface="Book Antiqua" pitchFamily="18" charset="0"/>
-            </a:endParaRPr>
           </a:p>
         </p:txBody>
       </p:sp>
@@ -5896,9 +5759,6 @@
               </a:rPr>
               <a:t>Island</a:t>
             </a:r>
-            <a:endParaRPr lang="en-US" sz="1100" b="1" i="1" dirty="0" smtClean="0">
-              <a:latin typeface="Book Antiqua" pitchFamily="18" charset="0"/>
-            </a:endParaRPr>
           </a:p>
         </p:txBody>
       </p:sp>
@@ -5938,9 +5798,6 @@
               </a:rPr>
               <a:t>Reyes</a:t>
             </a:r>
-            <a:endParaRPr lang="en-US" sz="1100" b="1" i="1" dirty="0" smtClean="0">
-              <a:latin typeface="Book Antiqua" pitchFamily="18" charset="0"/>
-            </a:endParaRPr>
           </a:p>
         </p:txBody>
       </p:sp>
@@ -6019,9 +5876,6 @@
               </a:rPr>
               <a:t>Rafter</a:t>
             </a:r>
-            <a:endParaRPr lang="en-US" sz="1100" b="1" i="1" dirty="0" smtClean="0">
-              <a:latin typeface="Book Antiqua" pitchFamily="18" charset="0"/>
-            </a:endParaRPr>
           </a:p>
         </p:txBody>
       </p:sp>
@@ -6053,9 +5907,6 @@
               </a:rPr>
               <a:t>Pinnacles</a:t>
             </a:r>
-            <a:endParaRPr lang="en-US" sz="1100" b="1" i="1" dirty="0" smtClean="0">
-              <a:latin typeface="Book Antiqua" pitchFamily="18" charset="0"/>
-            </a:endParaRPr>
           </a:p>
         </p:txBody>
       </p:sp>
@@ -6095,9 +5946,6 @@
               </a:rPr>
               <a:t>Camp</a:t>
             </a:r>
-            <a:endParaRPr lang="en-US" sz="1100" b="1" i="1" dirty="0" smtClean="0">
-              <a:latin typeface="Book Antiqua" pitchFamily="18" charset="0"/>
-            </a:endParaRPr>
           </a:p>
         </p:txBody>
       </p:sp>
@@ -6137,9 +5985,6 @@
               </a:rPr>
               <a:t>Valle</a:t>
             </a:r>
-            <a:endParaRPr lang="en-US" sz="1100" b="1" i="1" dirty="0" smtClean="0">
-              <a:latin typeface="Book Antiqua" pitchFamily="18" charset="0"/>
-            </a:endParaRPr>
           </a:p>
         </p:txBody>
       </p:sp>
@@ -6169,13 +6014,7 @@
               <a:rPr lang="en-US" sz="1100" b="1" i="1" dirty="0" smtClean="0">
                 <a:latin typeface="Book Antiqua" pitchFamily="18" charset="0"/>
               </a:rPr>
-              <a:t>SJ </a:t>
-            </a:r>
-            <a:r>
-              <a:rPr lang="en-US" sz="1100" b="1" i="1" dirty="0" smtClean="0">
-                <a:latin typeface="Book Antiqua" pitchFamily="18" charset="0"/>
-              </a:rPr>
-              <a:t>Rock</a:t>
+              <a:t>SJ Rock</a:t>
             </a:r>
           </a:p>
           <a:p>
@@ -6185,9 +6024,6 @@
               </a:rPr>
               <a:t>Climbing</a:t>
             </a:r>
-            <a:endParaRPr lang="en-US" sz="1100" b="1" i="1" dirty="0" smtClean="0">
-              <a:latin typeface="Book Antiqua" pitchFamily="18" charset="0"/>
-            </a:endParaRPr>
           </a:p>
         </p:txBody>
       </p:sp>
@@ -6217,13 +6053,7 @@
               <a:rPr lang="en-US" sz="1100" b="1" i="1" dirty="0" smtClean="0">
                 <a:latin typeface="Book Antiqua" pitchFamily="18" charset="0"/>
               </a:rPr>
-              <a:t>Northern Tier *or* Summit Lottery </a:t>
-            </a:r>
-            <a:r>
-              <a:rPr lang="en-US" sz="1100" b="1" i="1" dirty="0" smtClean="0">
-                <a:latin typeface="Book Antiqua" pitchFamily="18" charset="0"/>
-              </a:rPr>
-              <a:t>Submittal</a:t>
+              <a:t>Northern Tier *or* Summit Lottery Submittal</a:t>
             </a:r>
           </a:p>
         </p:txBody>
@@ -6358,17 +6188,8 @@
               <a:rPr lang="en-US" sz="1100" b="1" i="1" dirty="0" smtClean="0">
                 <a:latin typeface="Book Antiqua" pitchFamily="18" charset="0"/>
               </a:rPr>
-              <a:t>Sea </a:t>
-            </a:r>
-            <a:r>
-              <a:rPr lang="en-US" sz="1100" b="1" i="1" dirty="0" smtClean="0">
-                <a:latin typeface="Book Antiqua" pitchFamily="18" charset="0"/>
-              </a:rPr>
-              <a:t>Base ( 7/22 – 7/29)</a:t>
-            </a:r>
-            <a:endParaRPr lang="en-US" sz="1100" b="1" i="1" dirty="0" smtClean="0">
-              <a:latin typeface="Book Antiqua" pitchFamily="18" charset="0"/>
-            </a:endParaRPr>
+              <a:t>Sea Base ( 7/22 – 7/29)</a:t>
+            </a:r>
           </a:p>
         </p:txBody>
       </p:sp>
@@ -6578,9 +6399,6 @@
               </a:rPr>
               <a:t> (No Date Yet!)</a:t>
             </a:r>
-            <a:endParaRPr lang="en-US" sz="1100" b="1" i="1" dirty="0" smtClean="0">
-              <a:latin typeface="Book Antiqua" pitchFamily="18" charset="0"/>
-            </a:endParaRPr>
           </a:p>
         </p:txBody>
       </p:sp>
@@ -6668,13 +6486,7 @@
               <a:rPr lang="en-US" sz="1100" b="1" i="1" smtClean="0">
                 <a:latin typeface="Book Antiqua" pitchFamily="18" charset="0"/>
               </a:rPr>
-              <a:t>(</a:t>
-            </a:r>
-            <a:r>
-              <a:rPr lang="en-US" sz="1100" b="1" i="1" smtClean="0">
-                <a:latin typeface="Book Antiqua" pitchFamily="18" charset="0"/>
-              </a:rPr>
-              <a:t>SOR – May 12)</a:t>
+              <a:t>(SOR – May 12)</a:t>
             </a:r>
             <a:endParaRPr lang="en-US" sz="1100" b="1" i="1" dirty="0" smtClean="0">
               <a:latin typeface="Book Antiqua" pitchFamily="18" charset="0"/>
@@ -7383,6 +7195,13 @@
   <p:clrMapOvr>
     <a:masterClrMapping/>
   </p:clrMapOvr>
+  <p:timing>
+    <p:tnLst>
+      <p:par>
+        <p:cTn id="1" dur="indefinite" restart="never" nodeType="tmRoot"/>
+      </p:par>
+    </p:tnLst>
+  </p:timing>
 </p:sld>
 </file>
 

</xml_diff>